<commit_message>
Major rework for 1.62.0
</commit_message>
<xml_diff>
--- a/docs/images/overview.pptx
+++ b/docs/images/overview.pptx
@@ -269,7 +269,7 @@
           <a:p>
             <a:fld id="{008FFADC-39A7-449E-8C68-8776E6FB3C1A}" type="datetimeFigureOut">
               <a:rPr lang="en-GB" smtClean="0"/>
-              <a:t>10/05/2025</a:t>
+              <a:t>29/10/2025</a:t>
             </a:fld>
             <a:endParaRPr lang="en-GB"/>
           </a:p>
@@ -446,7 +446,7 @@
           <a:p>
             <a:fld id="{30B9BAAB-B703-4BB5-9D08-B460FC03C23A}" type="datetimeFigureOut">
               <a:rPr lang="en-GB" smtClean="0"/>
-              <a:t>10/05/2025</a:t>
+              <a:t>29/10/2025</a:t>
             </a:fld>
             <a:endParaRPr lang="en-GB"/>
           </a:p>
@@ -6047,19 +6047,19 @@
         </p:nvSpPr>
         <p:spPr>
           <a:xfrm>
-            <a:off x="3653014" y="1424763"/>
-            <a:ext cx="1927475" cy="1735468"/>
+            <a:off x="7642084" y="1185627"/>
+            <a:ext cx="1927475" cy="1940314"/>
           </a:xfrm>
           <a:prstGeom prst="rect">
             <a:avLst/>
           </a:prstGeom>
           <a:solidFill>
-            <a:schemeClr val="accent4">
-              <a:lumMod val="75000"/>
-            </a:schemeClr>
+            <a:schemeClr val="bg1"/>
           </a:solidFill>
           <a:ln>
-            <a:noFill/>
+            <a:solidFill>
+              <a:srgbClr val="363D66"/>
+            </a:solidFill>
           </a:ln>
         </p:spPr>
         <p:style>
@@ -6097,7 +6097,7 @@
                   <a:noFill/>
                 </a:ln>
                 <a:solidFill>
-                  <a:schemeClr val="bg1"/>
+                  <a:sysClr val="windowText" lastClr="000000"/>
                 </a:solidFill>
                 <a:effectLst/>
                 <a:uLnTx/>
@@ -6114,7 +6114,7 @@
                   <a:noFill/>
                 </a:ln>
                 <a:solidFill>
-                  <a:schemeClr val="bg1"/>
+                  <a:sysClr val="windowText" lastClr="000000"/>
                 </a:solidFill>
                 <a:effectLst/>
                 <a:uLnTx/>
@@ -6130,7 +6130,7 @@
                   <a:noFill/>
                 </a:ln>
                 <a:solidFill>
-                  <a:schemeClr val="bg1"/>
+                  <a:sysClr val="windowText" lastClr="000000"/>
                 </a:solidFill>
                 <a:effectLst/>
                 <a:uLnTx/>
@@ -6158,16 +6158,14 @@
         </p:nvSpPr>
         <p:spPr>
           <a:xfrm>
-            <a:off x="3653014" y="3308194"/>
+            <a:off x="7642084" y="3273904"/>
             <a:ext cx="1938116" cy="1143304"/>
           </a:xfrm>
           <a:prstGeom prst="rect">
             <a:avLst/>
           </a:prstGeom>
           <a:solidFill>
-            <a:schemeClr val="accent4">
-              <a:lumMod val="75000"/>
-            </a:schemeClr>
+            <a:srgbClr val="7233F7"/>
           </a:solidFill>
           <a:ln>
             <a:noFill/>
@@ -6294,8 +6292,8 @@
         </p:nvCxnSpPr>
         <p:spPr>
           <a:xfrm>
-            <a:off x="4622072" y="2939650"/>
-            <a:ext cx="0" cy="368544"/>
+            <a:off x="8611142" y="2772383"/>
+            <a:ext cx="0" cy="501521"/>
           </a:xfrm>
           <a:prstGeom prst="straightConnector1">
             <a:avLst/>
@@ -6338,7 +6336,7 @@
         </p:nvCxnSpPr>
         <p:spPr>
           <a:xfrm>
-            <a:off x="3314776" y="3802402"/>
+            <a:off x="7303846" y="3768112"/>
             <a:ext cx="338238" cy="0"/>
           </a:xfrm>
           <a:prstGeom prst="straightConnector1">
@@ -6380,21 +6378,18 @@
         </p:nvSpPr>
         <p:spPr>
           <a:xfrm>
-            <a:off x="1698070" y="3439639"/>
-            <a:ext cx="1616706" cy="905508"/>
+            <a:off x="5687140" y="3471275"/>
+            <a:ext cx="1616706" cy="760435"/>
           </a:xfrm>
           <a:prstGeom prst="flowChartDocument">
             <a:avLst/>
           </a:prstGeom>
           <a:solidFill>
-            <a:schemeClr val="accent5">
-              <a:lumMod val="60000"/>
-              <a:lumOff val="40000"/>
-            </a:schemeClr>
+            <a:schemeClr val="bg1"/>
           </a:solidFill>
-          <a:ln w="12700">
+          <a:ln w="19050">
             <a:solidFill>
-              <a:schemeClr val="accent1"/>
+              <a:srgbClr val="0057FF"/>
             </a:solidFill>
           </a:ln>
         </p:spPr>
@@ -6415,7 +6410,7 @@
           </a:fontRef>
         </p:style>
         <p:txBody>
-          <a:bodyPr rtlCol="0" anchor="ctr"/>
+          <a:bodyPr lIns="0" rIns="0" rtlCol="0" anchor="t"/>
           <a:lstStyle/>
           <a:p>
             <a:pPr algn="ctr" eaLnBrk="0" fontAlgn="base" hangingPunct="0">
@@ -6425,100 +6420,20 @@
               <a:spcAft>
                 <a:spcPct val="0"/>
               </a:spcAft>
-              <a:defRPr/>
             </a:pPr>
-            <a:br>
-              <a:rPr lang="en-US" sz="100" dirty="0">
-                <a:solidFill>
-                  <a:srgbClr val="E5ECEB">
-                    <a:lumMod val="25000"/>
-                  </a:srgbClr>
-                </a:solidFill>
-                <a:latin typeface="Calibri"/>
-              </a:rPr>
-            </a:br>
-            <a:r>
-              <a:rPr lang="en-US" sz="1250" dirty="0" err="1">
-                <a:solidFill>
-                  <a:srgbClr val="E5ECEB">
-                    <a:lumMod val="25000"/>
-                  </a:srgbClr>
-                </a:solidFill>
-                <a:latin typeface="Calibri"/>
-              </a:rPr>
-              <a:t>My+target</a:t>
-            </a:r>
-            <a:r>
-              <a:rPr lang="en-US" sz="1250" dirty="0">
-                <a:solidFill>
-                  <a:srgbClr val="E5ECEB">
-                    <a:lumMod val="25000"/>
-                  </a:srgbClr>
-                </a:solidFill>
-                <a:latin typeface="Calibri"/>
-              </a:rPr>
-              <a:t>.</a:t>
-            </a:r>
-            <a:br>
-              <a:rPr lang="en-US" sz="1250" dirty="0">
-                <a:solidFill>
-                  <a:srgbClr val="E5ECEB">
-                    <a:lumMod val="25000"/>
-                  </a:srgbClr>
-                </a:solidFill>
-                <a:latin typeface="Calibri"/>
-              </a:rPr>
-            </a:br>
-            <a:r>
-              <a:rPr lang="en-US" sz="1250" dirty="0" err="1">
-                <a:solidFill>
-                  <a:srgbClr val="E5ECEB">
-                    <a:lumMod val="25000"/>
-                  </a:srgbClr>
-                </a:solidFill>
-                <a:latin typeface="Calibri"/>
-              </a:rPr>
-              <a:t>cbuild-run.yml</a:t>
-            </a:r>
-            <a:br>
-              <a:rPr kumimoji="0" lang="en-US" sz="3600" b="0" i="0" u="none" strike="noStrike" kern="1200" cap="none" spc="0" normalizeH="0" baseline="0" noProof="0" dirty="0">
-                <a:ln>
-                  <a:noFill/>
-                </a:ln>
-                <a:solidFill>
-                  <a:srgbClr val="E5ECEB">
-                    <a:lumMod val="25000"/>
-                  </a:srgbClr>
-                </a:solidFill>
-                <a:effectLst/>
-                <a:uLnTx/>
-                <a:uFillTx/>
-                <a:latin typeface="Calibri"/>
-                <a:ea typeface="+mn-ea"/>
-                <a:cs typeface="+mn-cs"/>
-              </a:rPr>
-            </a:br>
-            <a:r>
-              <a:rPr kumimoji="0" lang="en-US" sz="1100" b="0" i="0" u="none" strike="noStrike" kern="1200" cap="none" spc="0" normalizeH="0" baseline="0" noProof="0" dirty="0">
-                <a:ln>
-                  <a:noFill/>
-                </a:ln>
+            <a:r>
+              <a:rPr lang="en-US" sz="1200" dirty="0">
                 <a:solidFill>
                   <a:schemeClr val="bg2">
                     <a:lumMod val="25000"/>
                   </a:schemeClr>
                 </a:solidFill>
-                <a:effectLst/>
-                <a:uLnTx/>
-                <a:uFillTx/>
                 <a:latin typeface="Calibri"/>
-                <a:ea typeface="+mn-ea"/>
-                <a:cs typeface="+mn-cs"/>
-              </a:rPr>
-              <a:t>Run and D</a:t>
-            </a:r>
-            <a:r>
-              <a:rPr lang="en-US" sz="1100" dirty="0" err="1">
+              </a:rPr>
+              <a:t>*.</a:t>
+            </a:r>
+            <a:r>
+              <a:rPr lang="en-US" sz="1200" dirty="0" err="1">
                 <a:solidFill>
                   <a:schemeClr val="bg2">
                     <a:lumMod val="25000"/>
@@ -6526,10 +6441,10 @@
                 </a:solidFill>
                 <a:latin typeface="Calibri"/>
               </a:rPr>
-              <a:t>ebug</a:t>
+              <a:t>cbuild-run.yml</a:t>
             </a:r>
             <a:br>
-              <a:rPr lang="en-US" sz="1100" dirty="0">
+              <a:rPr lang="en-US" sz="1200" dirty="0">
                 <a:solidFill>
                   <a:schemeClr val="bg2">
                     <a:lumMod val="25000"/>
@@ -6539,7 +6454,7 @@
               </a:rPr>
             </a:br>
             <a:r>
-              <a:rPr lang="en-US" sz="1100" dirty="0">
+              <a:rPr lang="en-US" sz="1200" b="1" dirty="0">
                 <a:solidFill>
                   <a:schemeClr val="bg2">
                     <a:lumMod val="25000"/>
@@ -6547,23 +6462,36 @@
                 </a:solidFill>
                 <a:latin typeface="Calibri"/>
               </a:rPr>
+              <a:t>Run and Debug</a:t>
+            </a:r>
+            <a:br>
+              <a:rPr lang="en-US" sz="1200" b="1" dirty="0">
+                <a:solidFill>
+                  <a:schemeClr val="bg2">
+                    <a:lumMod val="25000"/>
+                  </a:schemeClr>
+                </a:solidFill>
+                <a:latin typeface="Calibri"/>
+              </a:rPr>
+            </a:br>
+            <a:r>
+              <a:rPr lang="en-US" sz="1200" b="1" dirty="0">
+                <a:solidFill>
+                  <a:schemeClr val="bg2">
+                    <a:lumMod val="25000"/>
+                  </a:schemeClr>
+                </a:solidFill>
+                <a:latin typeface="Calibri"/>
+              </a:rPr>
               <a:t>Configuration</a:t>
             </a:r>
-            <a:endParaRPr kumimoji="0" lang="en-GB" sz="1100" b="0" i="0" u="none" strike="noStrike" kern="1200" cap="none" spc="0" normalizeH="0" baseline="0" noProof="0" dirty="0">
-              <a:ln>
-                <a:noFill/>
-              </a:ln>
+            <a:endParaRPr lang="en-GB" sz="1200" b="1" dirty="0">
               <a:solidFill>
-                <a:srgbClr val="E5ECEB">
+                <a:schemeClr val="bg2">
                   <a:lumMod val="25000"/>
-                </a:srgbClr>
+                </a:schemeClr>
               </a:solidFill>
-              <a:effectLst/>
-              <a:uLnTx/>
-              <a:uFillTx/>
               <a:latin typeface="Calibri"/>
-              <a:ea typeface="+mn-ea"/>
-              <a:cs typeface="+mn-cs"/>
             </a:endParaRPr>
           </a:p>
         </p:txBody>
@@ -6582,21 +6510,18 @@
         </p:nvSpPr>
         <p:spPr>
           <a:xfrm>
-            <a:off x="6037133" y="2503401"/>
-            <a:ext cx="1532797" cy="879174"/>
+            <a:off x="8036762" y="4872500"/>
+            <a:ext cx="1532797" cy="712754"/>
           </a:xfrm>
           <a:prstGeom prst="flowChartDocument">
             <a:avLst/>
           </a:prstGeom>
           <a:solidFill>
-            <a:schemeClr val="accent3">
-              <a:lumMod val="40000"/>
-              <a:lumOff val="60000"/>
-            </a:schemeClr>
+            <a:schemeClr val="bg1"/>
           </a:solidFill>
-          <a:ln w="12700">
+          <a:ln w="19050">
             <a:solidFill>
-              <a:schemeClr val="accent1"/>
+              <a:srgbClr val="0057FF"/>
             </a:solidFill>
           </a:ln>
         </p:spPr>
@@ -6617,7 +6542,7 @@
           </a:fontRef>
         </p:style>
         <p:txBody>
-          <a:bodyPr rtlCol="0" anchor="ctr"/>
+          <a:bodyPr lIns="0" rIns="0" rtlCol="0" anchor="t"/>
           <a:lstStyle/>
           <a:p>
             <a:pPr algn="ctr" eaLnBrk="0" fontAlgn="base" hangingPunct="0">
@@ -6627,86 +6552,69 @@
               <a:spcAft>
                 <a:spcPct val="0"/>
               </a:spcAft>
-              <a:defRPr/>
             </a:pPr>
             <a:r>
-              <a:rPr lang="en-GB" sz="1250" dirty="0">
-                <a:solidFill>
-                  <a:srgbClr val="E5ECEB">
+              <a:rPr lang="en-GB" sz="1200" dirty="0">
+                <a:solidFill>
+                  <a:schemeClr val="bg2">
                     <a:lumMod val="25000"/>
-                  </a:srgbClr>
+                  </a:schemeClr>
                 </a:solidFill>
                 <a:latin typeface="Calibri"/>
               </a:rPr>
               <a:t>./</a:t>
             </a:r>
             <a:r>
-              <a:rPr lang="en-GB" sz="1250" dirty="0" err="1">
-                <a:solidFill>
-                  <a:srgbClr val="E5ECEB">
+              <a:rPr lang="en-GB" sz="1200" dirty="0" err="1">
+                <a:solidFill>
+                  <a:schemeClr val="bg2">
                     <a:lumMod val="25000"/>
-                  </a:srgbClr>
+                  </a:schemeClr>
                 </a:solidFill>
                 <a:latin typeface="Calibri"/>
               </a:rPr>
               <a:t>vscode</a:t>
             </a:r>
             <a:r>
-              <a:rPr lang="en-GB" sz="1250" dirty="0">
-                <a:solidFill>
-                  <a:srgbClr val="E5ECEB">
+              <a:rPr lang="en-GB" sz="1200" dirty="0">
+                <a:solidFill>
+                  <a:schemeClr val="bg2">
                     <a:lumMod val="25000"/>
-                  </a:srgbClr>
+                  </a:schemeClr>
                 </a:solidFill>
                 <a:latin typeface="Calibri"/>
               </a:rPr>
               <a:t>/</a:t>
             </a:r>
             <a:r>
-              <a:rPr lang="en-GB" sz="1250" dirty="0" err="1">
-                <a:solidFill>
-                  <a:srgbClr val="E5ECEB">
+              <a:rPr lang="en-GB" sz="1200" dirty="0" err="1">
+                <a:solidFill>
+                  <a:schemeClr val="bg2">
                     <a:lumMod val="25000"/>
-                  </a:srgbClr>
+                  </a:schemeClr>
                 </a:solidFill>
                 <a:latin typeface="Calibri"/>
               </a:rPr>
               <a:t>launch.json</a:t>
             </a:r>
             <a:br>
-              <a:rPr kumimoji="0" lang="en-GB" sz="1100" b="0" i="0" u="none" strike="noStrike" kern="1200" cap="none" spc="0" normalizeH="0" baseline="0" noProof="0" dirty="0">
-                <a:ln>
-                  <a:noFill/>
-                </a:ln>
-                <a:solidFill>
-                  <a:srgbClr val="E5ECEB">
+              <a:rPr lang="en-GB" sz="1200" dirty="0">
+                <a:solidFill>
+                  <a:schemeClr val="bg2">
                     <a:lumMod val="25000"/>
-                  </a:srgbClr>
-                </a:solidFill>
-                <a:effectLst/>
-                <a:uLnTx/>
-                <a:uFillTx/>
+                  </a:schemeClr>
+                </a:solidFill>
                 <a:latin typeface="Calibri"/>
-                <a:ea typeface="+mn-ea"/>
-                <a:cs typeface="+mn-cs"/>
               </a:rPr>
             </a:br>
             <a:r>
-              <a:rPr kumimoji="0" lang="en-GB" sz="1100" b="0" i="0" u="none" strike="noStrike" kern="1200" cap="none" spc="0" normalizeH="0" baseline="0" noProof="0" dirty="0">
-                <a:ln>
-                  <a:noFill/>
-                </a:ln>
-                <a:solidFill>
-                  <a:srgbClr val="E5ECEB">
+              <a:rPr lang="en-GB" sz="1200" b="1" dirty="0">
+                <a:solidFill>
+                  <a:schemeClr val="bg2">
                     <a:lumMod val="25000"/>
-                  </a:srgbClr>
-                </a:solidFill>
-                <a:effectLst/>
-                <a:uLnTx/>
-                <a:uFillTx/>
+                  </a:schemeClr>
+                </a:solidFill>
                 <a:latin typeface="Calibri"/>
-                <a:ea typeface="+mn-ea"/>
-                <a:cs typeface="+mn-cs"/>
               </a:rPr>
               <a:t>Debug  Setup</a:t>
             </a:r>
@@ -6727,7 +6635,7 @@
         </p:nvSpPr>
         <p:spPr>
           <a:xfrm>
-            <a:off x="4054675" y="2004722"/>
+            <a:off x="8043745" y="1808633"/>
             <a:ext cx="1399143" cy="716999"/>
           </a:xfrm>
           <a:prstGeom prst="flowChartDocument">
@@ -6738,9 +6646,7 @@
           </a:solidFill>
           <a:ln w="12700">
             <a:solidFill>
-              <a:schemeClr val="accent1">
-                <a:lumMod val="75000"/>
-              </a:schemeClr>
+              <a:srgbClr val="0057FF"/>
             </a:solidFill>
           </a:ln>
         </p:spPr>
@@ -6809,7 +6715,7 @@
         </p:nvSpPr>
         <p:spPr>
           <a:xfrm>
-            <a:off x="3909372" y="2171298"/>
+            <a:off x="7898442" y="1975209"/>
             <a:ext cx="1399143" cy="716999"/>
           </a:xfrm>
           <a:prstGeom prst="flowChartDocument">
@@ -6820,9 +6726,7 @@
           </a:solidFill>
           <a:ln w="12700">
             <a:solidFill>
-              <a:schemeClr val="accent1">
-                <a:lumMod val="75000"/>
-              </a:schemeClr>
+              <a:srgbClr val="0057FF"/>
             </a:solidFill>
           </a:ln>
         </p:spPr>
@@ -6891,7 +6795,7 @@
         </p:nvSpPr>
         <p:spPr>
           <a:xfrm>
-            <a:off x="3778244" y="2337874"/>
+            <a:off x="7767314" y="2141785"/>
             <a:ext cx="1399143" cy="716999"/>
           </a:xfrm>
           <a:prstGeom prst="flowChartDocument">
@@ -6902,9 +6806,7 @@
           </a:solidFill>
           <a:ln w="12700">
             <a:solidFill>
-              <a:schemeClr val="accent1">
-                <a:lumMod val="75000"/>
-              </a:schemeClr>
+              <a:srgbClr val="0057FF"/>
             </a:solidFill>
           </a:ln>
         </p:spPr>
@@ -7066,21 +6968,18 @@
         </p:nvSpPr>
         <p:spPr>
           <a:xfrm>
-            <a:off x="6037133" y="3572324"/>
-            <a:ext cx="1532797" cy="879174"/>
+            <a:off x="6365645" y="4872501"/>
+            <a:ext cx="1532797" cy="712754"/>
           </a:xfrm>
           <a:prstGeom prst="flowChartDocument">
             <a:avLst/>
           </a:prstGeom>
           <a:solidFill>
-            <a:schemeClr val="accent3">
-              <a:lumMod val="40000"/>
-              <a:lumOff val="60000"/>
-            </a:schemeClr>
+            <a:schemeClr val="bg1"/>
           </a:solidFill>
-          <a:ln w="12700">
+          <a:ln w="19050">
             <a:solidFill>
-              <a:schemeClr val="accent1"/>
+              <a:srgbClr val="0057FF"/>
             </a:solidFill>
           </a:ln>
         </p:spPr>
@@ -7101,7 +7000,7 @@
           </a:fontRef>
         </p:style>
         <p:txBody>
-          <a:bodyPr rtlCol="0" anchor="ctr"/>
+          <a:bodyPr lIns="0" rIns="0" rtlCol="0" anchor="t"/>
           <a:lstStyle/>
           <a:p>
             <a:pPr algn="ctr" eaLnBrk="0" fontAlgn="base" hangingPunct="0">
@@ -7111,115 +7010,90 @@
               <a:spcAft>
                 <a:spcPct val="0"/>
               </a:spcAft>
-              <a:defRPr/>
             </a:pPr>
             <a:r>
-              <a:rPr lang="en-GB" sz="1250" dirty="0">
-                <a:solidFill>
-                  <a:srgbClr val="E5ECEB">
+              <a:rPr lang="en-GB" sz="1200" dirty="0">
+                <a:solidFill>
+                  <a:schemeClr val="bg2">
                     <a:lumMod val="25000"/>
-                  </a:srgbClr>
+                  </a:schemeClr>
                 </a:solidFill>
                 <a:latin typeface="Calibri"/>
               </a:rPr>
               <a:t>./</a:t>
             </a:r>
             <a:r>
-              <a:rPr lang="en-GB" sz="1250" dirty="0" err="1">
-                <a:solidFill>
-                  <a:srgbClr val="E5ECEB">
+              <a:rPr lang="en-GB" sz="1200" dirty="0" err="1">
+                <a:solidFill>
+                  <a:schemeClr val="bg2">
                     <a:lumMod val="25000"/>
-                  </a:srgbClr>
+                  </a:schemeClr>
                 </a:solidFill>
                 <a:latin typeface="Calibri"/>
               </a:rPr>
               <a:t>vscode</a:t>
             </a:r>
             <a:r>
-              <a:rPr lang="en-GB" sz="1250" dirty="0">
-                <a:solidFill>
-                  <a:srgbClr val="E5ECEB">
+              <a:rPr lang="en-GB" sz="1200" dirty="0">
+                <a:solidFill>
+                  <a:schemeClr val="bg2">
                     <a:lumMod val="25000"/>
-                  </a:srgbClr>
+                  </a:schemeClr>
                 </a:solidFill>
                 <a:latin typeface="Calibri"/>
               </a:rPr>
               <a:t>/</a:t>
             </a:r>
             <a:r>
-              <a:rPr lang="en-GB" sz="1250" dirty="0" err="1">
-                <a:solidFill>
-                  <a:srgbClr val="E5ECEB">
+              <a:rPr lang="en-GB" sz="1200" dirty="0" err="1">
+                <a:solidFill>
+                  <a:schemeClr val="bg2">
                     <a:lumMod val="25000"/>
-                  </a:srgbClr>
+                  </a:schemeClr>
                 </a:solidFill>
                 <a:latin typeface="Calibri"/>
               </a:rPr>
               <a:t>tasks.json</a:t>
             </a:r>
             <a:br>
-              <a:rPr lang="en-GB" sz="1250" dirty="0">
-                <a:solidFill>
-                  <a:srgbClr val="E5ECEB">
+              <a:rPr lang="en-GB" sz="1200" dirty="0">
+                <a:solidFill>
+                  <a:schemeClr val="bg2">
                     <a:lumMod val="25000"/>
-                  </a:srgbClr>
+                  </a:schemeClr>
                 </a:solidFill>
                 <a:latin typeface="Calibri"/>
               </a:rPr>
             </a:br>
             <a:r>
-              <a:rPr kumimoji="0" lang="en-GB" sz="1100" b="0" i="0" u="none" strike="noStrike" kern="1200" cap="none" spc="0" normalizeH="0" baseline="0" noProof="0" dirty="0">
-                <a:ln>
-                  <a:noFill/>
-                </a:ln>
-                <a:solidFill>
-                  <a:srgbClr val="E5ECEB">
+              <a:rPr lang="en-GB" sz="1200" b="1" dirty="0">
+                <a:solidFill>
+                  <a:schemeClr val="bg2">
                     <a:lumMod val="25000"/>
-                  </a:srgbClr>
-                </a:solidFill>
-                <a:effectLst/>
-                <a:uLnTx/>
-                <a:uFillTx/>
+                  </a:schemeClr>
+                </a:solidFill>
                 <a:latin typeface="Calibri"/>
-                <a:ea typeface="+mn-ea"/>
-                <a:cs typeface="+mn-cs"/>
               </a:rPr>
               <a:t>Command Line</a:t>
             </a:r>
             <a:br>
-              <a:rPr kumimoji="0" lang="en-GB" sz="1100" b="0" i="0" u="none" strike="noStrike" kern="1200" cap="none" spc="0" normalizeH="0" baseline="0" noProof="0" dirty="0">
-                <a:ln>
-                  <a:noFill/>
-                </a:ln>
-                <a:solidFill>
-                  <a:srgbClr val="E5ECEB">
+              <a:rPr lang="en-GB" sz="1200" b="1" dirty="0">
+                <a:solidFill>
+                  <a:schemeClr val="bg2">
                     <a:lumMod val="25000"/>
-                  </a:srgbClr>
-                </a:solidFill>
-                <a:effectLst/>
-                <a:uLnTx/>
-                <a:uFillTx/>
+                  </a:schemeClr>
+                </a:solidFill>
                 <a:latin typeface="Calibri"/>
-                <a:ea typeface="+mn-ea"/>
-                <a:cs typeface="+mn-cs"/>
               </a:rPr>
             </a:br>
             <a:r>
-              <a:rPr kumimoji="0" lang="en-GB" sz="1100" b="0" i="0" u="none" strike="noStrike" kern="1200" cap="none" spc="0" normalizeH="0" baseline="0" noProof="0" dirty="0">
-                <a:ln>
-                  <a:noFill/>
-                </a:ln>
-                <a:solidFill>
-                  <a:srgbClr val="E5ECEB">
+              <a:rPr lang="en-GB" sz="1200" b="1" dirty="0">
+                <a:solidFill>
+                  <a:schemeClr val="bg2">
                     <a:lumMod val="25000"/>
-                  </a:srgbClr>
-                </a:solidFill>
-                <a:effectLst/>
-                <a:uLnTx/>
-                <a:uFillTx/>
+                  </a:schemeClr>
+                </a:solidFill>
                 <a:latin typeface="Calibri"/>
-                <a:ea typeface="+mn-ea"/>
-                <a:cs typeface="+mn-cs"/>
               </a:rPr>
               <a:t>Tool Setup</a:t>
             </a:r>
@@ -7237,14 +7111,15 @@
           </p:cNvPr>
           <p:cNvCxnSpPr>
             <a:cxnSpLocks/>
-            <a:endCxn id="31" idx="1"/>
+            <a:stCxn id="21" idx="2"/>
+            <a:endCxn id="31" idx="0"/>
           </p:cNvCxnSpPr>
           <p:nvPr/>
         </p:nvCxnSpPr>
         <p:spPr>
-          <a:xfrm flipV="1">
-            <a:off x="5591130" y="4011911"/>
-            <a:ext cx="446003" cy="11129"/>
+          <a:xfrm flipH="1">
+            <a:off x="7132044" y="4417208"/>
+            <a:ext cx="1479098" cy="455293"/>
           </a:xfrm>
           <a:prstGeom prst="straightConnector1">
             <a:avLst/>
@@ -7282,13 +7157,15 @@
           </p:cNvPr>
           <p:cNvCxnSpPr>
             <a:cxnSpLocks/>
+            <a:stCxn id="21" idx="2"/>
+            <a:endCxn id="2" idx="0"/>
           </p:cNvCxnSpPr>
           <p:nvPr/>
         </p:nvCxnSpPr>
         <p:spPr>
-          <a:xfrm flipV="1">
-            <a:off x="5591130" y="3123922"/>
-            <a:ext cx="430085" cy="381643"/>
+          <a:xfrm>
+            <a:off x="8611142" y="4417208"/>
+            <a:ext cx="192019" cy="455292"/>
           </a:xfrm>
           <a:prstGeom prst="straightConnector1">
             <a:avLst/>
@@ -7317,10 +7194,10 @@
       </p:cxnSp>
       <p:sp>
         <p:nvSpPr>
-          <p:cNvPr id="54" name="Rectangle 53">
+          <p:cNvPr id="5" name="Flowchart: Document 5">
             <a:extLst>
               <a:ext uri="{FF2B5EF4-FFF2-40B4-BE49-F238E27FC236}">
-                <a16:creationId xmlns:a16="http://schemas.microsoft.com/office/drawing/2014/main" id="{417F999B-F1CB-2D67-CB10-A5896912C0D9}"/>
+                <a16:creationId xmlns:a16="http://schemas.microsoft.com/office/drawing/2014/main" id="{159176EE-DDE1-675A-8A14-11CE452CDBDE}"/>
               </a:ext>
             </a:extLst>
           </p:cNvPr>
@@ -7329,20 +7206,313 @@
         </p:nvSpPr>
         <p:spPr>
           <a:xfrm>
-            <a:off x="1587449" y="2888297"/>
-            <a:ext cx="1927475" cy="1563201"/>
+            <a:off x="2464512" y="3471275"/>
+            <a:ext cx="1333416" cy="760435"/>
+          </a:xfrm>
+          <a:prstGeom prst="flowChartDocument">
+            <a:avLst/>
+          </a:prstGeom>
+          <a:solidFill>
+            <a:schemeClr val="bg1"/>
+          </a:solidFill>
+          <a:ln w="19050">
+            <a:solidFill>
+              <a:srgbClr val="0057FF"/>
+            </a:solidFill>
+          </a:ln>
+        </p:spPr>
+        <p:style>
+          <a:lnRef idx="2">
+            <a:schemeClr val="accent1">
+              <a:shade val="50000"/>
+            </a:schemeClr>
+          </a:lnRef>
+          <a:fillRef idx="1">
+            <a:schemeClr val="accent1"/>
+          </a:fillRef>
+          <a:effectRef idx="0">
+            <a:schemeClr val="accent1"/>
+          </a:effectRef>
+          <a:fontRef idx="minor">
+            <a:schemeClr val="lt1"/>
+          </a:fontRef>
+        </p:style>
+        <p:txBody>
+          <a:bodyPr lIns="0" rIns="0" rtlCol="0" anchor="t"/>
+          <a:lstStyle/>
+          <a:p>
+            <a:pPr marL="0" marR="0" lvl="0" indent="0" algn="ctr" defTabSz="914400" rtl="0" eaLnBrk="0" fontAlgn="base" latinLnBrk="0" hangingPunct="0">
+              <a:lnSpc>
+                <a:spcPct val="100000"/>
+              </a:lnSpc>
+              <a:spcBef>
+                <a:spcPct val="0"/>
+              </a:spcBef>
+              <a:spcAft>
+                <a:spcPct val="0"/>
+              </a:spcAft>
+              <a:buClrTx/>
+              <a:buSzTx/>
+              <a:buFontTx/>
+              <a:buNone/>
+              <a:tabLst/>
+              <a:defRPr/>
+            </a:pPr>
+            <a:r>
+              <a:rPr kumimoji="0" lang="en-US" sz="1200" b="0" i="0" u="none" strike="noStrike" kern="1200" cap="none" spc="0" normalizeH="0" baseline="0" noProof="0" dirty="0">
+                <a:ln>
+                  <a:noFill/>
+                </a:ln>
+                <a:solidFill>
+                  <a:schemeClr val="bg2">
+                    <a:lumMod val="25000"/>
+                  </a:schemeClr>
+                </a:solidFill>
+                <a:effectLst/>
+                <a:uLnTx/>
+                <a:uFillTx/>
+                <a:latin typeface="Calibri"/>
+                <a:ea typeface="+mn-ea"/>
+                <a:cs typeface="+mn-cs"/>
+              </a:rPr>
+              <a:t>*.</a:t>
+            </a:r>
+            <a:r>
+              <a:rPr kumimoji="0" lang="en-US" sz="1200" b="0" i="0" u="none" strike="noStrike" kern="1200" cap="none" spc="0" normalizeH="0" baseline="0" noProof="0" dirty="0" err="1">
+                <a:ln>
+                  <a:noFill/>
+                </a:ln>
+                <a:solidFill>
+                  <a:schemeClr val="bg2">
+                    <a:lumMod val="25000"/>
+                  </a:schemeClr>
+                </a:solidFill>
+                <a:effectLst/>
+                <a:uLnTx/>
+                <a:uFillTx/>
+                <a:latin typeface="Calibri"/>
+                <a:ea typeface="+mn-ea"/>
+                <a:cs typeface="+mn-cs"/>
+              </a:rPr>
+              <a:t>csolution.yml</a:t>
+            </a:r>
+            <a:br>
+              <a:rPr kumimoji="0" lang="en-US" sz="1200" b="0" i="0" u="none" strike="noStrike" kern="1200" cap="none" spc="0" normalizeH="0" baseline="0" noProof="0" dirty="0">
+                <a:ln>
+                  <a:noFill/>
+                </a:ln>
+                <a:solidFill>
+                  <a:schemeClr val="bg2">
+                    <a:lumMod val="25000"/>
+                  </a:schemeClr>
+                </a:solidFill>
+                <a:effectLst/>
+                <a:uLnTx/>
+                <a:uFillTx/>
+                <a:latin typeface="Calibri"/>
+                <a:ea typeface="+mn-ea"/>
+                <a:cs typeface="+mn-cs"/>
+              </a:rPr>
+            </a:br>
+            <a:r>
+              <a:rPr kumimoji="0" lang="en-US" sz="1200" b="1" i="0" u="none" strike="noStrike" kern="1200" cap="none" spc="0" normalizeH="0" baseline="0" noProof="0" dirty="0">
+                <a:ln>
+                  <a:noFill/>
+                </a:ln>
+                <a:solidFill>
+                  <a:schemeClr val="bg2">
+                    <a:lumMod val="25000"/>
+                  </a:schemeClr>
+                </a:solidFill>
+                <a:effectLst/>
+                <a:uLnTx/>
+                <a:uFillTx/>
+                <a:latin typeface="Calibri"/>
+                <a:ea typeface="+mn-ea"/>
+                <a:cs typeface="+mn-cs"/>
+              </a:rPr>
+              <a:t>Target and Build</a:t>
+            </a:r>
+            <a:br>
+              <a:rPr kumimoji="0" lang="en-US" sz="1200" b="1" i="0" u="none" strike="noStrike" kern="1200" cap="none" spc="0" normalizeH="0" baseline="0" noProof="0" dirty="0">
+                <a:ln>
+                  <a:noFill/>
+                </a:ln>
+                <a:solidFill>
+                  <a:schemeClr val="bg2">
+                    <a:lumMod val="25000"/>
+                  </a:schemeClr>
+                </a:solidFill>
+                <a:effectLst/>
+                <a:uLnTx/>
+                <a:uFillTx/>
+                <a:latin typeface="Calibri"/>
+                <a:ea typeface="+mn-ea"/>
+                <a:cs typeface="+mn-cs"/>
+              </a:rPr>
+            </a:br>
+            <a:r>
+              <a:rPr kumimoji="0" lang="en-US" sz="1200" b="1" i="0" u="none" strike="noStrike" kern="1200" cap="none" spc="0" normalizeH="0" baseline="0" noProof="0" dirty="0">
+                <a:ln>
+                  <a:noFill/>
+                </a:ln>
+                <a:solidFill>
+                  <a:schemeClr val="bg2">
+                    <a:lumMod val="25000"/>
+                  </a:schemeClr>
+                </a:solidFill>
+                <a:effectLst/>
+                <a:uLnTx/>
+                <a:uFillTx/>
+                <a:latin typeface="Calibri"/>
+                <a:ea typeface="+mn-ea"/>
+                <a:cs typeface="+mn-cs"/>
+              </a:rPr>
+              <a:t>Parameters</a:t>
+            </a:r>
+            <a:endParaRPr kumimoji="0" lang="en-GB" sz="1200" b="1" i="0" u="none" strike="noStrike" kern="1200" cap="none" spc="0" normalizeH="0" baseline="0" noProof="0" dirty="0">
+              <a:ln>
+                <a:noFill/>
+              </a:ln>
+              <a:solidFill>
+                <a:schemeClr val="bg2">
+                  <a:lumMod val="25000"/>
+                </a:schemeClr>
+              </a:solidFill>
+              <a:effectLst/>
+              <a:uLnTx/>
+              <a:uFillTx/>
+              <a:latin typeface="Calibri"/>
+              <a:ea typeface="+mn-ea"/>
+              <a:cs typeface="+mn-cs"/>
+            </a:endParaRPr>
+          </a:p>
+        </p:txBody>
+      </p:sp>
+      <p:sp>
+        <p:nvSpPr>
+          <p:cNvPr id="8" name="Rectangle 7">
+            <a:extLst>
+              <a:ext uri="{FF2B5EF4-FFF2-40B4-BE49-F238E27FC236}">
+                <a16:creationId xmlns:a16="http://schemas.microsoft.com/office/drawing/2014/main" id="{D6B95903-DD7F-8FF1-F6EB-3EE97F773A6A}"/>
+              </a:ext>
+            </a:extLst>
+          </p:cNvPr>
+          <p:cNvSpPr/>
+          <p:nvPr/>
+        </p:nvSpPr>
+        <p:spPr>
+          <a:xfrm>
+            <a:off x="4238368" y="3471275"/>
+            <a:ext cx="968752" cy="760435"/>
           </a:xfrm>
           <a:prstGeom prst="rect">
             <a:avLst/>
           </a:prstGeom>
-          <a:noFill/>
+          <a:solidFill>
+            <a:srgbClr val="7233F7"/>
+          </a:solidFill>
           <a:ln>
-            <a:solidFill>
-              <a:schemeClr val="tx2">
-                <a:lumMod val="60000"/>
-                <a:lumOff val="40000"/>
-              </a:schemeClr>
-            </a:solidFill>
+            <a:noFill/>
+          </a:ln>
+        </p:spPr>
+        <p:style>
+          <a:lnRef idx="2">
+            <a:schemeClr val="accent1">
+              <a:shade val="50000"/>
+            </a:schemeClr>
+          </a:lnRef>
+          <a:fillRef idx="1">
+            <a:schemeClr val="accent1"/>
+          </a:fillRef>
+          <a:effectRef idx="0">
+            <a:schemeClr val="accent1"/>
+          </a:effectRef>
+          <a:fontRef idx="minor">
+            <a:schemeClr val="lt1"/>
+          </a:fontRef>
+        </p:style>
+        <p:txBody>
+          <a:bodyPr rtlCol="0" anchor="ctr"/>
+          <a:lstStyle/>
+          <a:p>
+            <a:pPr marL="0" marR="0" lvl="0" indent="0" algn="ctr" defTabSz="914400" rtl="0" eaLnBrk="0" fontAlgn="base" latinLnBrk="0" hangingPunct="0">
+              <a:lnSpc>
+                <a:spcPct val="100000"/>
+              </a:lnSpc>
+              <a:spcBef>
+                <a:spcPct val="0"/>
+              </a:spcBef>
+              <a:spcAft>
+                <a:spcPct val="0"/>
+              </a:spcAft>
+              <a:buClrTx/>
+              <a:buSzTx/>
+              <a:buFontTx/>
+              <a:buNone/>
+              <a:tabLst/>
+              <a:defRPr/>
+            </a:pPr>
+            <a:r>
+              <a:rPr lang="en-US" b="1" dirty="0" err="1">
+                <a:solidFill>
+                  <a:srgbClr val="FFFFFF"/>
+                </a:solidFill>
+                <a:latin typeface="Calibri"/>
+              </a:rPr>
+              <a:t>cbuild</a:t>
+            </a:r>
+            <a:r>
+              <a:rPr lang="en-US" b="1" dirty="0">
+                <a:solidFill>
+                  <a:srgbClr val="FFFFFF"/>
+                </a:solidFill>
+                <a:latin typeface="Calibri"/>
+              </a:rPr>
+              <a:t> setup</a:t>
+            </a:r>
+            <a:endParaRPr kumimoji="0" lang="en-GB" sz="1200" b="0" i="0" u="none" strike="noStrike" kern="1200" cap="none" spc="0" normalizeH="0" baseline="0" noProof="0" dirty="0">
+              <a:ln>
+                <a:noFill/>
+              </a:ln>
+              <a:solidFill>
+                <a:srgbClr val="FFFFFF"/>
+              </a:solidFill>
+              <a:effectLst/>
+              <a:uLnTx/>
+              <a:uFillTx/>
+              <a:latin typeface="Calibri"/>
+              <a:ea typeface="+mn-ea"/>
+              <a:cs typeface="+mn-cs"/>
+            </a:endParaRPr>
+          </a:p>
+        </p:txBody>
+      </p:sp>
+      <p:sp>
+        <p:nvSpPr>
+          <p:cNvPr id="13" name="Rectangle 12">
+            <a:extLst>
+              <a:ext uri="{FF2B5EF4-FFF2-40B4-BE49-F238E27FC236}">
+                <a16:creationId xmlns:a16="http://schemas.microsoft.com/office/drawing/2014/main" id="{0055F286-98ED-736D-38FC-3F4E14EB85F6}"/>
+              </a:ext>
+            </a:extLst>
+          </p:cNvPr>
+          <p:cNvSpPr/>
+          <p:nvPr/>
+        </p:nvSpPr>
+        <p:spPr>
+          <a:xfrm>
+            <a:off x="2239657" y="1185627"/>
+            <a:ext cx="1783126" cy="1940314"/>
+          </a:xfrm>
+          <a:prstGeom prst="rect">
+            <a:avLst/>
+          </a:prstGeom>
+          <a:solidFill>
+            <a:srgbClr val="7233F7"/>
+          </a:solidFill>
+          <a:ln>
+            <a:noFill/>
           </a:ln>
         </p:spPr>
         <p:style>
@@ -7365,38 +7535,257 @@
           <a:bodyPr rtlCol="0" anchor="t"/>
           <a:lstStyle/>
           <a:p>
-            <a:pPr algn="ctr" eaLnBrk="0" fontAlgn="base" hangingPunct="0">
+            <a:pPr marL="0" marR="0" lvl="0" indent="0" algn="ctr" defTabSz="914400" rtl="0" eaLnBrk="0" fontAlgn="base" latinLnBrk="0" hangingPunct="0">
+              <a:lnSpc>
+                <a:spcPct val="100000"/>
+              </a:lnSpc>
               <a:spcBef>
                 <a:spcPct val="0"/>
               </a:spcBef>
               <a:spcAft>
                 <a:spcPct val="0"/>
               </a:spcAft>
+              <a:buClrTx/>
+              <a:buSzTx/>
+              <a:buFontTx/>
+              <a:buNone/>
+              <a:tabLst/>
               <a:defRPr/>
             </a:pPr>
             <a:r>
-              <a:rPr kumimoji="0" lang="en-US" sz="1400" i="0" u="none" strike="noStrike" kern="1200" cap="none" spc="0" normalizeH="0" baseline="0" noProof="0" dirty="0">
+              <a:rPr kumimoji="0" lang="en-US" b="1" i="0" u="none" strike="noStrike" kern="1200" cap="none" spc="0" normalizeH="0" baseline="0" noProof="0" dirty="0">
                 <a:ln>
                   <a:noFill/>
                 </a:ln>
                 <a:solidFill>
-                  <a:schemeClr val="tx1">
-                    <a:lumMod val="65000"/>
-                    <a:lumOff val="35000"/>
-                  </a:schemeClr>
+                  <a:schemeClr val="bg1"/>
                 </a:solidFill>
                 <a:effectLst/>
                 <a:uLnTx/>
                 <a:uFillTx/>
                 <a:latin typeface="Calibri"/>
-                <a:ea typeface="ＭＳ Ｐゴシック" panose="020B0600070205080204" pitchFamily="34" charset="-128"/>
+                <a:ea typeface="+mn-ea"/>
                 <a:cs typeface="+mn-cs"/>
               </a:rPr>
-              <a:t>Build Information Output</a:t>
-            </a:r>
+              <a:t>CMSIS Solution</a:t>
+            </a:r>
+            <a:br>
+              <a:rPr kumimoji="0" lang="en-US" b="1" i="0" u="none" strike="noStrike" kern="1200" cap="none" spc="0" normalizeH="0" baseline="0" noProof="0" dirty="0">
+                <a:ln>
+                  <a:noFill/>
+                </a:ln>
+                <a:solidFill>
+                  <a:schemeClr val="bg1"/>
+                </a:solidFill>
+                <a:effectLst/>
+                <a:uLnTx/>
+                <a:uFillTx/>
+                <a:latin typeface="Calibri"/>
+                <a:ea typeface="+mn-ea"/>
+                <a:cs typeface="+mn-cs"/>
+              </a:rPr>
+            </a:br>
+            <a:r>
+              <a:rPr kumimoji="0" lang="en-US" b="1" i="0" u="none" strike="noStrike" kern="1200" cap="none" spc="0" normalizeH="0" baseline="0" noProof="0" dirty="0">
+                <a:ln>
+                  <a:noFill/>
+                </a:ln>
+                <a:solidFill>
+                  <a:schemeClr val="bg1"/>
+                </a:solidFill>
+                <a:effectLst/>
+                <a:uLnTx/>
+                <a:uFillTx/>
+                <a:latin typeface="Calibri"/>
+                <a:ea typeface="+mn-ea"/>
+                <a:cs typeface="+mn-cs"/>
+              </a:rPr>
+              <a:t>Extension</a:t>
+            </a:r>
+            <a:endParaRPr kumimoji="0" lang="en-GB" sz="1100" b="0" i="0" u="none" strike="noStrike" kern="1200" cap="none" spc="0" normalizeH="0" baseline="0" noProof="0" dirty="0">
+              <a:ln>
+                <a:noFill/>
+              </a:ln>
+              <a:solidFill>
+                <a:schemeClr val="bg1"/>
+              </a:solidFill>
+              <a:effectLst/>
+              <a:uLnTx/>
+              <a:uFillTx/>
+              <a:latin typeface="Calibri"/>
+              <a:ea typeface="+mn-ea"/>
+              <a:cs typeface="+mn-cs"/>
+            </a:endParaRPr>
           </a:p>
         </p:txBody>
       </p:sp>
+      <p:pic>
+        <p:nvPicPr>
+          <p:cNvPr id="14" name="Picture 13">
+            <a:extLst>
+              <a:ext uri="{FF2B5EF4-FFF2-40B4-BE49-F238E27FC236}">
+                <a16:creationId xmlns:a16="http://schemas.microsoft.com/office/drawing/2014/main" id="{EC9645C1-4375-E245-30F1-4C76B0936293}"/>
+              </a:ext>
+            </a:extLst>
+          </p:cNvPr>
+          <p:cNvPicPr>
+            <a:picLocks noChangeAspect="1"/>
+          </p:cNvPicPr>
+          <p:nvPr/>
+        </p:nvPicPr>
+        <p:blipFill>
+          <a:blip r:embed="rId4"/>
+          <a:stretch>
+            <a:fillRect/>
+          </a:stretch>
+        </p:blipFill>
+        <p:spPr>
+          <a:xfrm>
+            <a:off x="2345296" y="1891141"/>
+            <a:ext cx="1571848" cy="1155940"/>
+          </a:xfrm>
+          <a:prstGeom prst="rect">
+            <a:avLst/>
+          </a:prstGeom>
+        </p:spPr>
+      </p:pic>
+      <p:cxnSp>
+        <p:nvCxnSpPr>
+          <p:cNvPr id="16" name="Straight Arrow Connector 15">
+            <a:extLst>
+              <a:ext uri="{FF2B5EF4-FFF2-40B4-BE49-F238E27FC236}">
+                <a16:creationId xmlns:a16="http://schemas.microsoft.com/office/drawing/2014/main" id="{810D109A-C1CC-997B-4D90-1858CB89A538}"/>
+              </a:ext>
+            </a:extLst>
+          </p:cNvPr>
+          <p:cNvCxnSpPr>
+            <a:cxnSpLocks/>
+            <a:stCxn id="13" idx="2"/>
+          </p:cNvCxnSpPr>
+          <p:nvPr/>
+        </p:nvCxnSpPr>
+        <p:spPr>
+          <a:xfrm>
+            <a:off x="3131220" y="3125941"/>
+            <a:ext cx="1782" cy="345334"/>
+          </a:xfrm>
+          <a:prstGeom prst="straightConnector1">
+            <a:avLst/>
+          </a:prstGeom>
+          <a:ln w="15875">
+            <a:solidFill>
+              <a:schemeClr val="tx2"/>
+            </a:solidFill>
+            <a:tailEnd type="triangle"/>
+          </a:ln>
+        </p:spPr>
+        <p:style>
+          <a:lnRef idx="1">
+            <a:schemeClr val="accent1"/>
+          </a:lnRef>
+          <a:fillRef idx="0">
+            <a:schemeClr val="accent1"/>
+          </a:fillRef>
+          <a:effectRef idx="0">
+            <a:schemeClr val="accent1"/>
+          </a:effectRef>
+          <a:fontRef idx="minor">
+            <a:schemeClr val="tx1"/>
+          </a:fontRef>
+        </p:style>
+      </p:cxnSp>
+      <p:cxnSp>
+        <p:nvCxnSpPr>
+          <p:cNvPr id="20" name="Straight Arrow Connector 19">
+            <a:extLst>
+              <a:ext uri="{FF2B5EF4-FFF2-40B4-BE49-F238E27FC236}">
+                <a16:creationId xmlns:a16="http://schemas.microsoft.com/office/drawing/2014/main" id="{4BA6E628-2480-C4BC-C4A8-B985BCE60C10}"/>
+              </a:ext>
+            </a:extLst>
+          </p:cNvPr>
+          <p:cNvCxnSpPr>
+            <a:cxnSpLocks/>
+            <a:stCxn id="5" idx="3"/>
+            <a:endCxn id="8" idx="1"/>
+          </p:cNvCxnSpPr>
+          <p:nvPr/>
+        </p:nvCxnSpPr>
+        <p:spPr>
+          <a:xfrm>
+            <a:off x="3797928" y="3851493"/>
+            <a:ext cx="440440" cy="0"/>
+          </a:xfrm>
+          <a:prstGeom prst="straightConnector1">
+            <a:avLst/>
+          </a:prstGeom>
+          <a:ln w="15875">
+            <a:solidFill>
+              <a:schemeClr val="tx2"/>
+            </a:solidFill>
+            <a:tailEnd type="triangle"/>
+          </a:ln>
+        </p:spPr>
+        <p:style>
+          <a:lnRef idx="1">
+            <a:schemeClr val="accent1"/>
+          </a:lnRef>
+          <a:fillRef idx="0">
+            <a:schemeClr val="accent1"/>
+          </a:fillRef>
+          <a:effectRef idx="0">
+            <a:schemeClr val="accent1"/>
+          </a:effectRef>
+          <a:fontRef idx="minor">
+            <a:schemeClr val="tx1"/>
+          </a:fontRef>
+        </p:style>
+      </p:cxnSp>
+      <p:cxnSp>
+        <p:nvCxnSpPr>
+          <p:cNvPr id="25" name="Straight Arrow Connector 24">
+            <a:extLst>
+              <a:ext uri="{FF2B5EF4-FFF2-40B4-BE49-F238E27FC236}">
+                <a16:creationId xmlns:a16="http://schemas.microsoft.com/office/drawing/2014/main" id="{B0C3EFF7-1D4A-C879-590E-EF768AFAFBBF}"/>
+              </a:ext>
+            </a:extLst>
+          </p:cNvPr>
+          <p:cNvCxnSpPr>
+            <a:cxnSpLocks/>
+            <a:stCxn id="8" idx="3"/>
+            <a:endCxn id="15" idx="1"/>
+          </p:cNvCxnSpPr>
+          <p:nvPr/>
+        </p:nvCxnSpPr>
+        <p:spPr>
+          <a:xfrm>
+            <a:off x="5207120" y="3851493"/>
+            <a:ext cx="480020" cy="0"/>
+          </a:xfrm>
+          <a:prstGeom prst="straightConnector1">
+            <a:avLst/>
+          </a:prstGeom>
+          <a:ln w="15875">
+            <a:solidFill>
+              <a:schemeClr val="tx2"/>
+            </a:solidFill>
+            <a:tailEnd type="triangle"/>
+          </a:ln>
+        </p:spPr>
+        <p:style>
+          <a:lnRef idx="1">
+            <a:schemeClr val="accent1"/>
+          </a:lnRef>
+          <a:fillRef idx="0">
+            <a:schemeClr val="accent1"/>
+          </a:fillRef>
+          <a:effectRef idx="0">
+            <a:schemeClr val="accent1"/>
+          </a:effectRef>
+          <a:fontRef idx="minor">
+            <a:schemeClr val="tx1"/>
+          </a:fontRef>
+        </p:style>
+      </p:cxnSp>
     </p:spTree>
     <p:custDataLst>
       <p:tags r:id="rId1"/>

</xml_diff>